<commit_message>
planning nu echt eindelijk werkend
</commit_message>
<xml_diff>
--- a/Powerlift Powerpoint.pptx
+++ b/Powerlift Powerpoint.pptx
@@ -198,7 +198,7 @@
           <a:p>
             <a:fld id="{E04F55B4-3D82-41BD-BAF2-7F77C4CCB1BA}" type="datetimeFigureOut">
               <a:rPr lang="nl-NL" smtClean="0"/>
-              <a:t>24-5-2020</a:t>
+              <a:t>25-5-2020</a:t>
             </a:fld>
             <a:endParaRPr lang="nl-NL"/>
           </a:p>
@@ -833,7 +833,7 @@
           <a:p>
             <a:fld id="{045A98CA-CFA4-4C5C-9D89-EEDC72AFD99E}" type="datetimeFigureOut">
               <a:rPr lang="nl-NL" smtClean="0"/>
-              <a:t>24-5-2020</a:t>
+              <a:t>25-5-2020</a:t>
             </a:fld>
             <a:endParaRPr lang="nl-NL"/>
           </a:p>
@@ -1003,7 +1003,7 @@
           <a:p>
             <a:fld id="{045A98CA-CFA4-4C5C-9D89-EEDC72AFD99E}" type="datetimeFigureOut">
               <a:rPr lang="nl-NL" smtClean="0"/>
-              <a:t>24-5-2020</a:t>
+              <a:t>25-5-2020</a:t>
             </a:fld>
             <a:endParaRPr lang="nl-NL"/>
           </a:p>
@@ -1183,7 +1183,7 @@
           <a:p>
             <a:fld id="{045A98CA-CFA4-4C5C-9D89-EEDC72AFD99E}" type="datetimeFigureOut">
               <a:rPr lang="nl-NL" smtClean="0"/>
-              <a:t>24-5-2020</a:t>
+              <a:t>25-5-2020</a:t>
             </a:fld>
             <a:endParaRPr lang="nl-NL"/>
           </a:p>
@@ -1353,7 +1353,7 @@
           <a:p>
             <a:fld id="{045A98CA-CFA4-4C5C-9D89-EEDC72AFD99E}" type="datetimeFigureOut">
               <a:rPr lang="nl-NL" smtClean="0"/>
-              <a:t>24-5-2020</a:t>
+              <a:t>25-5-2020</a:t>
             </a:fld>
             <a:endParaRPr lang="nl-NL"/>
           </a:p>
@@ -1599,7 +1599,7 @@
           <a:p>
             <a:fld id="{045A98CA-CFA4-4C5C-9D89-EEDC72AFD99E}" type="datetimeFigureOut">
               <a:rPr lang="nl-NL" smtClean="0"/>
-              <a:t>24-5-2020</a:t>
+              <a:t>25-5-2020</a:t>
             </a:fld>
             <a:endParaRPr lang="nl-NL"/>
           </a:p>
@@ -1887,7 +1887,7 @@
           <a:p>
             <a:fld id="{045A98CA-CFA4-4C5C-9D89-EEDC72AFD99E}" type="datetimeFigureOut">
               <a:rPr lang="nl-NL" smtClean="0"/>
-              <a:t>24-5-2020</a:t>
+              <a:t>25-5-2020</a:t>
             </a:fld>
             <a:endParaRPr lang="nl-NL"/>
           </a:p>
@@ -2309,7 +2309,7 @@
           <a:p>
             <a:fld id="{045A98CA-CFA4-4C5C-9D89-EEDC72AFD99E}" type="datetimeFigureOut">
               <a:rPr lang="nl-NL" smtClean="0"/>
-              <a:t>24-5-2020</a:t>
+              <a:t>25-5-2020</a:t>
             </a:fld>
             <a:endParaRPr lang="nl-NL"/>
           </a:p>
@@ -2427,7 +2427,7 @@
           <a:p>
             <a:fld id="{045A98CA-CFA4-4C5C-9D89-EEDC72AFD99E}" type="datetimeFigureOut">
               <a:rPr lang="nl-NL" smtClean="0"/>
-              <a:t>24-5-2020</a:t>
+              <a:t>25-5-2020</a:t>
             </a:fld>
             <a:endParaRPr lang="nl-NL"/>
           </a:p>
@@ -2522,7 +2522,7 @@
           <a:p>
             <a:fld id="{045A98CA-CFA4-4C5C-9D89-EEDC72AFD99E}" type="datetimeFigureOut">
               <a:rPr lang="nl-NL" smtClean="0"/>
-              <a:t>24-5-2020</a:t>
+              <a:t>25-5-2020</a:t>
             </a:fld>
             <a:endParaRPr lang="nl-NL"/>
           </a:p>
@@ -2799,7 +2799,7 @@
           <a:p>
             <a:fld id="{045A98CA-CFA4-4C5C-9D89-EEDC72AFD99E}" type="datetimeFigureOut">
               <a:rPr lang="nl-NL" smtClean="0"/>
-              <a:t>24-5-2020</a:t>
+              <a:t>25-5-2020</a:t>
             </a:fld>
             <a:endParaRPr lang="nl-NL"/>
           </a:p>
@@ -3052,7 +3052,7 @@
           <a:p>
             <a:fld id="{045A98CA-CFA4-4C5C-9D89-EEDC72AFD99E}" type="datetimeFigureOut">
               <a:rPr lang="nl-NL" smtClean="0"/>
-              <a:t>24-5-2020</a:t>
+              <a:t>25-5-2020</a:t>
             </a:fld>
             <a:endParaRPr lang="nl-NL"/>
           </a:p>
@@ -3268,7 +3268,7 @@
           <a:p>
             <a:fld id="{045A98CA-CFA4-4C5C-9D89-EEDC72AFD99E}" type="datetimeFigureOut">
               <a:rPr lang="nl-NL" smtClean="0"/>
-              <a:t>24-5-2020</a:t>
+              <a:t>25-5-2020</a:t>
             </a:fld>
             <a:endParaRPr lang="nl-NL"/>
           </a:p>
@@ -3754,7 +3754,7 @@
           </p:cNvPicPr>
           <p:nvPr/>
         </p:nvPicPr>
-        <p:blipFill>
+        <p:blipFill rotWithShape="1">
           <a:blip r:embed="rId2" cstate="print">
             <a:extLst>
               <a:ext uri="{28A0092B-C50C-407E-A947-70E740481C1C}">
@@ -3762,15 +3762,13 @@
               </a:ext>
             </a:extLst>
           </a:blip>
-          <a:srcRect/>
-          <a:stretch>
-            <a:fillRect/>
-          </a:stretch>
+          <a:srcRect t="3614"/>
+          <a:stretch/>
         </p:blipFill>
         <p:spPr bwMode="auto">
           <a:xfrm>
-            <a:off x="755576" y="2422682"/>
-            <a:ext cx="2016224" cy="2016224"/>
+            <a:off x="899592" y="2510286"/>
+            <a:ext cx="2016224" cy="1943353"/>
           </a:xfrm>
           <a:prstGeom prst="rect">
             <a:avLst/>
@@ -3862,7 +3860,7 @@
         </p:blipFill>
         <p:spPr bwMode="auto">
           <a:xfrm>
-            <a:off x="3923928" y="1831543"/>
+            <a:off x="3995936" y="1834172"/>
             <a:ext cx="1800200" cy="1800200"/>
           </a:xfrm>
           <a:prstGeom prst="rect">
@@ -3909,13 +3907,13 @@
               </a:ext>
             </a:extLst>
           </a:blip>
-          <a:srcRect l="11944" t="14363" r="14260" b="12800"/>
+          <a:srcRect l="15711" t="15304" r="14260" b="12799"/>
           <a:stretch/>
         </p:blipFill>
         <p:spPr bwMode="auto">
           <a:xfrm>
-            <a:off x="6748863" y="2662084"/>
-            <a:ext cx="1800200" cy="1776822"/>
+            <a:off x="6840747" y="2734271"/>
+            <a:ext cx="1708316" cy="1753873"/>
           </a:xfrm>
           <a:prstGeom prst="rect">
             <a:avLst/>

</xml_diff>